<commit_message>
create before and after controllers
</commit_message>
<xml_diff>
--- a/MvcSummit/HeyControllersDotNetEmForma/ppt/Hey Controllers hora do dot net em forma.pptx
+++ b/MvcSummit/HeyControllersDotNetEmForma/ppt/Hey Controllers hora do dot net em forma.pptx
@@ -659,7 +659,7 @@
             <a:fld id="{81331B57-0BE5-4F82-AA58-76F53EFF3ADA}" type="datetime8">
               <a:rPr lang="en-US" smtClean="0"/>
               <a:pPr/>
-              <a:t>3/24/2011 6:08 PM</a:t>
+              <a:t>3/25/2011 5:49 PM</a:t>
             </a:fld>
             <a:endParaRPr lang="en-US" dirty="0"/>
           </a:p>
@@ -1411,7 +1411,7 @@
                 <a:ea typeface="+mn-ea"/>
               </a:rPr>
               <a:pPr/>
-              <a:t>3/24/2011</a:t>
+              <a:t>3/25/2011</a:t>
             </a:fld>
             <a:endParaRPr lang="en-US" sz="1800">
               <a:solidFill>
@@ -1660,7 +1660,7 @@
                 <a:ea typeface="+mn-ea"/>
               </a:rPr>
               <a:pPr/>
-              <a:t>3/24/2011</a:t>
+              <a:t>3/25/2011</a:t>
             </a:fld>
             <a:endParaRPr lang="en-US" sz="1800">
               <a:solidFill>
@@ -1975,7 +1975,7 @@
                 <a:ea typeface="+mn-ea"/>
               </a:rPr>
               <a:pPr/>
-              <a:t>3/24/2011</a:t>
+              <a:t>3/25/2011</a:t>
             </a:fld>
             <a:endParaRPr lang="en-US" sz="1800">
               <a:solidFill>
@@ -2340,7 +2340,7 @@
                 <a:ea typeface="+mn-ea"/>
               </a:rPr>
               <a:pPr/>
-              <a:t>3/24/2011</a:t>
+              <a:t>3/25/2011</a:t>
             </a:fld>
             <a:endParaRPr lang="en-US" sz="1800">
               <a:solidFill>
@@ -2845,7 +2845,7 @@
                 <a:ea typeface="+mn-ea"/>
               </a:rPr>
               <a:pPr/>
-              <a:t>3/24/2011</a:t>
+              <a:t>3/25/2011</a:t>
             </a:fld>
             <a:endParaRPr lang="en-US" sz="1800">
               <a:solidFill>
@@ -3034,7 +3034,7 @@
                 <a:ea typeface="+mn-ea"/>
               </a:rPr>
               <a:pPr/>
-              <a:t>3/24/2011</a:t>
+              <a:t>3/25/2011</a:t>
             </a:fld>
             <a:endParaRPr lang="en-US" sz="1800">
               <a:solidFill>
@@ -3192,7 +3192,7 @@
                 <a:ea typeface="+mn-ea"/>
               </a:rPr>
               <a:pPr/>
-              <a:t>3/24/2011</a:t>
+              <a:t>3/25/2011</a:t>
             </a:fld>
             <a:endParaRPr lang="en-US" sz="1800">
               <a:solidFill>
@@ -3641,7 +3641,7 @@
                 <a:ea typeface="+mn-ea"/>
               </a:rPr>
               <a:pPr/>
-              <a:t>3/24/2011</a:t>
+              <a:t>3/25/2011</a:t>
             </a:fld>
             <a:endParaRPr lang="en-US" sz="1800">
               <a:solidFill>
@@ -3966,7 +3966,7 @@
                 <a:ea typeface="+mn-ea"/>
               </a:rPr>
               <a:pPr/>
-              <a:t>3/24/2011</a:t>
+              <a:t>3/25/2011</a:t>
             </a:fld>
             <a:endParaRPr lang="en-US" sz="1800">
               <a:solidFill>
@@ -4215,7 +4215,7 @@
                 <a:ea typeface="+mn-ea"/>
               </a:rPr>
               <a:pPr/>
-              <a:t>3/24/2011</a:t>
+              <a:t>3/25/2011</a:t>
             </a:fld>
             <a:endParaRPr lang="en-US" sz="1800">
               <a:solidFill>
@@ -4464,7 +4464,7 @@
                 <a:ea typeface="+mn-ea"/>
               </a:rPr>
               <a:pPr/>
-              <a:t>3/24/2011</a:t>
+              <a:t>3/25/2011</a:t>
             </a:fld>
             <a:endParaRPr lang="en-US" sz="1800">
               <a:solidFill>
@@ -6689,7 +6689,7 @@
         </p:nvSpPr>
         <p:spPr>
           <a:xfrm>
-            <a:off x="381000" y="3733800"/>
+            <a:off x="381000" y="3830521"/>
             <a:ext cx="8077200" cy="1752600"/>
           </a:xfrm>
         </p:spPr>
@@ -6712,11 +6712,7 @@
           <a:p>
             <a:r>
               <a:rPr lang="en-US" dirty="0" smtClean="0"/>
-              <a:t>Consultant</a:t>
-            </a:r>
-            <a:r>
-              <a:rPr lang="en-US" dirty="0" smtClean="0"/>
-              <a:t>, Headspring</a:t>
+              <a:t>Consultant, Headspring</a:t>
             </a:r>
           </a:p>
           <a:p>
@@ -6724,7 +6720,6 @@
               <a:rPr lang="en-US" dirty="0" smtClean="0"/>
               <a:t>pedro@headspring.com</a:t>
             </a:r>
-            <a:endParaRPr lang="en-US" dirty="0" smtClean="0"/>
           </a:p>
           <a:p>
             <a:r>
@@ -6740,11 +6735,7 @@
           <a:p>
             <a:r>
               <a:rPr lang="en-US" dirty="0" smtClean="0"/>
-              <a:t>http</a:t>
-            </a:r>
-            <a:r>
-              <a:rPr lang="en-US" dirty="0" smtClean="0"/>
-              <a:t>://pedroreys.com</a:t>
+              <a:t>http://pedroreys.com</a:t>
             </a:r>
             <a:endParaRPr lang="en-US" dirty="0"/>
           </a:p>
@@ -6852,8 +6843,8 @@
         </p:nvSpPr>
         <p:spPr>
           <a:xfrm>
-            <a:off x="17332" y="381000"/>
-            <a:ext cx="9126668" cy="609600"/>
+            <a:off x="304800" y="838200"/>
+            <a:ext cx="7620000" cy="609600"/>
           </a:xfrm>
         </p:spPr>
         <p:txBody>
@@ -6861,16 +6852,46 @@
           <a:lstStyle/>
           <a:p>
             <a:r>
+              <a:rPr lang="en-US" sz="3600" dirty="0" err="1" smtClean="0"/>
+              <a:t>Ei</a:t>
+            </a:r>
+            <a:r>
               <a:rPr lang="en-US" sz="3600" dirty="0" smtClean="0"/>
-              <a:t>Hey, Controllers, </a:t>
-            </a:r>
+              <a:t> </a:t>
+            </a:r>
+            <a:r>
+              <a:rPr lang="en-US" sz="3600" dirty="0" smtClean="0"/>
+              <a:t>Controllers</a:t>
+            </a:r>
+            <a:r>
+              <a:rPr lang="en-US" sz="3600" dirty="0" smtClean="0"/>
+              <a:t>,</a:t>
+            </a:r>
+            <a:br>
+              <a:rPr lang="en-US" sz="3600" dirty="0" smtClean="0"/>
+            </a:br>
             <a:r>
               <a:rPr lang="en-US" sz="3600" dirty="0" err="1" smtClean="0"/>
               <a:t>hora</a:t>
             </a:r>
             <a:r>
               <a:rPr lang="en-US" sz="3600" dirty="0" smtClean="0"/>
-              <a:t> do #</a:t>
+              <a:t> </a:t>
+            </a:r>
+            <a:r>
+              <a:rPr lang="en-US" sz="3600" dirty="0" smtClean="0"/>
+              <a:t>do </a:t>
+            </a:r>
+            <a:r>
+              <a:rPr lang="en-US" sz="3600" dirty="0" smtClean="0"/>
+              <a:t/>
+            </a:r>
+            <a:br>
+              <a:rPr lang="en-US" sz="3600" dirty="0" smtClean="0"/>
+            </a:br>
+            <a:r>
+              <a:rPr lang="en-US" sz="3600" dirty="0" smtClean="0"/>
+              <a:t>#</a:t>
             </a:r>
             <a:r>
               <a:rPr lang="en-US" sz="3600" dirty="0" err="1" smtClean="0"/>
@@ -6880,72 +6901,47 @@
           </a:p>
         </p:txBody>
       </p:sp>
-      <p:sp>
-        <p:nvSpPr>
-          <p:cNvPr id="10" name="Subtitle 2"/>
-          <p:cNvSpPr txBox="1">
-            <a:spLocks/>
-          </p:cNvSpPr>
+      <p:pic>
+        <p:nvPicPr>
+          <p:cNvPr id="1026" name="Picture 2" descr="http://0.tqn.com/d/animatedtv/1/0/4/L/simpFatBart_v300_1_72.jpg"/>
+          <p:cNvPicPr>
+            <a:picLocks noChangeAspect="1" noChangeArrowheads="1"/>
+          </p:cNvPicPr>
           <p:nvPr/>
-        </p:nvSpPr>
+        </p:nvPicPr>
+        <p:blipFill>
+          <a:blip r:embed="rId6">
+            <a:extLst>
+              <a:ext uri="{28A0092B-C50C-407E-A947-70E740481C1C}">
+                <a14:useLocalDpi xmlns:a14="http://schemas.microsoft.com/office/drawing/2010/main" val="0"/>
+              </a:ext>
+            </a:extLst>
+          </a:blip>
+          <a:srcRect/>
+          <a:stretch>
+            <a:fillRect/>
+          </a:stretch>
+        </p:blipFill>
         <p:spPr bwMode="auto">
           <a:xfrm>
-            <a:off x="457200" y="914400"/>
-            <a:ext cx="6400800" cy="1752600"/>
+            <a:off x="4632388" y="0"/>
+            <a:ext cx="4511612" cy="5583121"/>
           </a:xfrm>
           <a:prstGeom prst="rect">
             <a:avLst/>
           </a:prstGeom>
           <a:noFill/>
-          <a:ln w="9525">
-            <a:noFill/>
-            <a:miter lim="800000"/>
-            <a:headEnd/>
-            <a:tailEnd/>
-          </a:ln>
-        </p:spPr>
-        <p:txBody>
-          <a:bodyPr vert="horz" wrap="square" lIns="91440" tIns="45720" rIns="91440" bIns="45720" numCol="1" anchor="t" anchorCtr="0" compatLnSpc="1">
-            <a:prstTxWarp prst="textNoShape">
-              <a:avLst/>
-            </a:prstTxWarp>
-          </a:bodyPr>
-          <a:lstStyle/>
-          <a:p>
-            <a:pPr marL="0" marR="0" lvl="0" indent="0" algn="l" defTabSz="914400" rtl="0" eaLnBrk="1" fontAlgn="base" latinLnBrk="0" hangingPunct="1">
-              <a:lnSpc>
-                <a:spcPct val="100000"/>
-              </a:lnSpc>
-              <a:spcBef>
-                <a:spcPct val="20000"/>
-              </a:spcBef>
-              <a:spcAft>
-                <a:spcPct val="0"/>
-              </a:spcAft>
-              <a:buClrTx/>
-              <a:buSzTx/>
-              <a:buFontTx/>
-              <a:buNone/>
-              <a:tabLst/>
-              <a:defRPr/>
-            </a:pPr>
-            <a:endParaRPr kumimoji="0" lang="en-US" sz="1500" b="0" i="0" u="none" strike="noStrike" kern="0" cap="none" spc="0" normalizeH="0" baseline="0" noProof="0" dirty="0">
-              <a:ln>
-                <a:noFill/>
-              </a:ln>
-              <a:solidFill>
-                <a:schemeClr val="bg1"/>
-              </a:solidFill>
-              <a:effectLst/>
-              <a:uLnTx/>
-              <a:uFillTx/>
-              <a:latin typeface="+mn-lt"/>
-              <a:ea typeface="+mn-ea"/>
-              <a:cs typeface="+mn-cs"/>
-            </a:endParaRPr>
-          </a:p>
-        </p:txBody>
-      </p:sp>
+          <a:extLst>
+            <a:ext uri="{909E8E84-426E-40DD-AFC4-6F175D3DCCD1}">
+              <a14:hiddenFill xmlns:a14="http://schemas.microsoft.com/office/drawing/2010/main">
+                <a:solidFill>
+                  <a:srgbClr val="FFFFFF"/>
+                </a:solidFill>
+              </a14:hiddenFill>
+            </a:ext>
+          </a:extLst>
+        </p:spPr>
+      </p:pic>
     </p:spTree>
   </p:cSld>
   <p:clrMapOvr>

</xml_diff>

<commit_message>
Versao ao fim da palestra
</commit_message>
<xml_diff>
--- a/MvcSummit/HeyControllersDotNetEmForma/ppt/Hey Controllers hora do dot net em forma.pptx
+++ b/MvcSummit/HeyControllersDotNetEmForma/ppt/Hey Controllers hora do dot net em forma.pptx
@@ -659,7 +659,7 @@
             <a:fld id="{81331B57-0BE5-4F82-AA58-76F53EFF3ADA}" type="datetime8">
               <a:rPr lang="en-US" smtClean="0"/>
               <a:pPr/>
-              <a:t>3/25/2011 5:49 PM</a:t>
+              <a:t>3/26/2011 12:49 PM</a:t>
             </a:fld>
             <a:endParaRPr lang="en-US" dirty="0"/>
           </a:p>
@@ -1411,7 +1411,7 @@
                 <a:ea typeface="+mn-ea"/>
               </a:rPr>
               <a:pPr/>
-              <a:t>3/25/2011</a:t>
+              <a:t>3/26/2011</a:t>
             </a:fld>
             <a:endParaRPr lang="en-US" sz="1800">
               <a:solidFill>
@@ -1660,7 +1660,7 @@
                 <a:ea typeface="+mn-ea"/>
               </a:rPr>
               <a:pPr/>
-              <a:t>3/25/2011</a:t>
+              <a:t>3/26/2011</a:t>
             </a:fld>
             <a:endParaRPr lang="en-US" sz="1800">
               <a:solidFill>
@@ -1975,7 +1975,7 @@
                 <a:ea typeface="+mn-ea"/>
               </a:rPr>
               <a:pPr/>
-              <a:t>3/25/2011</a:t>
+              <a:t>3/26/2011</a:t>
             </a:fld>
             <a:endParaRPr lang="en-US" sz="1800">
               <a:solidFill>
@@ -2340,7 +2340,7 @@
                 <a:ea typeface="+mn-ea"/>
               </a:rPr>
               <a:pPr/>
-              <a:t>3/25/2011</a:t>
+              <a:t>3/26/2011</a:t>
             </a:fld>
             <a:endParaRPr lang="en-US" sz="1800">
               <a:solidFill>
@@ -2845,7 +2845,7 @@
                 <a:ea typeface="+mn-ea"/>
               </a:rPr>
               <a:pPr/>
-              <a:t>3/25/2011</a:t>
+              <a:t>3/26/2011</a:t>
             </a:fld>
             <a:endParaRPr lang="en-US" sz="1800">
               <a:solidFill>
@@ -3034,7 +3034,7 @@
                 <a:ea typeface="+mn-ea"/>
               </a:rPr>
               <a:pPr/>
-              <a:t>3/25/2011</a:t>
+              <a:t>3/26/2011</a:t>
             </a:fld>
             <a:endParaRPr lang="en-US" sz="1800">
               <a:solidFill>
@@ -3192,7 +3192,7 @@
                 <a:ea typeface="+mn-ea"/>
               </a:rPr>
               <a:pPr/>
-              <a:t>3/25/2011</a:t>
+              <a:t>3/26/2011</a:t>
             </a:fld>
             <a:endParaRPr lang="en-US" sz="1800">
               <a:solidFill>
@@ -3641,7 +3641,7 @@
                 <a:ea typeface="+mn-ea"/>
               </a:rPr>
               <a:pPr/>
-              <a:t>3/25/2011</a:t>
+              <a:t>3/26/2011</a:t>
             </a:fld>
             <a:endParaRPr lang="en-US" sz="1800">
               <a:solidFill>
@@ -3966,7 +3966,7 @@
                 <a:ea typeface="+mn-ea"/>
               </a:rPr>
               <a:pPr/>
-              <a:t>3/25/2011</a:t>
+              <a:t>3/26/2011</a:t>
             </a:fld>
             <a:endParaRPr lang="en-US" sz="1800">
               <a:solidFill>
@@ -4215,7 +4215,7 @@
                 <a:ea typeface="+mn-ea"/>
               </a:rPr>
               <a:pPr/>
-              <a:t>3/25/2011</a:t>
+              <a:t>3/26/2011</a:t>
             </a:fld>
             <a:endParaRPr lang="en-US" sz="1800">
               <a:solidFill>
@@ -4464,7 +4464,7 @@
                 <a:ea typeface="+mn-ea"/>
               </a:rPr>
               <a:pPr/>
-              <a:t>3/25/2011</a:t>
+              <a:t>3/26/2011</a:t>
             </a:fld>
             <a:endParaRPr lang="en-US" sz="1800">
               <a:solidFill>
@@ -6857,15 +6857,7 @@
             </a:r>
             <a:r>
               <a:rPr lang="en-US" sz="3600" dirty="0" smtClean="0"/>
-              <a:t> </a:t>
-            </a:r>
-            <a:r>
-              <a:rPr lang="en-US" sz="3600" dirty="0" smtClean="0"/>
-              <a:t>Controllers</a:t>
-            </a:r>
-            <a:r>
-              <a:rPr lang="en-US" sz="3600" dirty="0" smtClean="0"/>
-              <a:t>,</a:t>
+              <a:t> Controllers,</a:t>
             </a:r>
             <a:br>
               <a:rPr lang="en-US" sz="3600" dirty="0" smtClean="0"/>
@@ -6876,15 +6868,7 @@
             </a:r>
             <a:r>
               <a:rPr lang="en-US" sz="3600" dirty="0" smtClean="0"/>
-              <a:t> </a:t>
-            </a:r>
-            <a:r>
-              <a:rPr lang="en-US" sz="3600" dirty="0" smtClean="0"/>
-              <a:t>do </a:t>
-            </a:r>
-            <a:r>
-              <a:rPr lang="en-US" sz="3600" dirty="0" smtClean="0"/>
-              <a:t/>
+              <a:t> do </a:t>
             </a:r>
             <a:br>
               <a:rPr lang="en-US" sz="3600" dirty="0" smtClean="0"/>
@@ -7677,7 +7661,22 @@
             </a:r>
             <a:r>
               <a:rPr lang="en-US" sz="3200" dirty="0"/>
-              <a:t>://bit.ly/pedroreys_mvcsummit</a:t>
+              <a:t>://</a:t>
+            </a:r>
+            <a:r>
+              <a:rPr lang="en-US" sz="3200" dirty="0" smtClean="0"/>
+              <a:t>bit.ly/pedroreys_mvcsummit</a:t>
+            </a:r>
+          </a:p>
+          <a:p>
+            <a:pPr algn="ctr"/>
+            <a:endParaRPr lang="en-US" sz="3200" dirty="0" smtClean="0"/>
+          </a:p>
+          <a:p>
+            <a:pPr algn="ctr"/>
+            <a:r>
+              <a:rPr lang="pt-BR" sz="3200" dirty="0"/>
+              <a:t>http://spkr8.com/t/6949</a:t>
             </a:r>
             <a:endParaRPr lang="pt-BR" sz="3200" dirty="0"/>
           </a:p>
@@ -8012,7 +8011,7 @@
                 </a:effectLst>
                 <a:ea typeface="+mn-ea"/>
               </a:rPr>
-              <a:t>Julho</a:t>
+              <a:t>Junho</a:t>
             </a:r>
             <a:r>
               <a:rPr lang="en-US" sz="4400" dirty="0" smtClean="0">
@@ -8034,7 +8033,29 @@
                 </a:effectLst>
                 <a:ea typeface="+mn-ea"/>
               </a:rPr>
-              <a:t> de 2011</a:t>
+              <a:t> </a:t>
+            </a:r>
+            <a:r>
+              <a:rPr lang="en-US" sz="4400" dirty="0" smtClean="0">
+                <a:ln w="18415" cmpd="sng">
+                  <a:solidFill>
+                    <a:srgbClr val="FFFFFF"/>
+                  </a:solidFill>
+                  <a:prstDash val="solid"/>
+                </a:ln>
+                <a:solidFill>
+                  <a:srgbClr val="FFFFFF"/>
+                </a:solidFill>
+                <a:effectLst>
+                  <a:outerShdw blurRad="63500" dir="3600000" algn="tl" rotWithShape="0">
+                    <a:srgbClr val="000000">
+                      <a:alpha val="70000"/>
+                    </a:srgbClr>
+                  </a:outerShdw>
+                </a:effectLst>
+                <a:ea typeface="+mn-ea"/>
+              </a:rPr>
+              <a:t>de 2011</a:t>
             </a:r>
           </a:p>
           <a:p>

</xml_diff>